<commit_message>
updated number of seeds to 15
</commit_message>
<xml_diff>
--- a/236802/ARL presentation.pptx
+++ b/236802/ARL presentation.pptx
@@ -300,7 +300,7 @@
           <a:p>
             <a:fld id="{2942B52E-AAA8-43C8-B328-AD22BB1092E1}" type="datetimeFigureOut">
               <a:rPr lang="en-US" smtClean="0"/>
-              <a:t>6/6/21</a:t>
+              <a:t>6/9/21</a:t>
             </a:fld>
             <a:endParaRPr lang="en-US"/>
           </a:p>
@@ -500,7 +500,7 @@
           <a:p>
             <a:fld id="{2942B52E-AAA8-43C8-B328-AD22BB1092E1}" type="datetimeFigureOut">
               <a:rPr lang="en-US" smtClean="0"/>
-              <a:t>6/6/21</a:t>
+              <a:t>6/9/21</a:t>
             </a:fld>
             <a:endParaRPr lang="en-US"/>
           </a:p>
@@ -710,7 +710,7 @@
           <a:p>
             <a:fld id="{2942B52E-AAA8-43C8-B328-AD22BB1092E1}" type="datetimeFigureOut">
               <a:rPr lang="en-US" smtClean="0"/>
-              <a:t>6/6/21</a:t>
+              <a:t>6/9/21</a:t>
             </a:fld>
             <a:endParaRPr lang="en-US"/>
           </a:p>
@@ -910,7 +910,7 @@
           <a:p>
             <a:fld id="{2942B52E-AAA8-43C8-B328-AD22BB1092E1}" type="datetimeFigureOut">
               <a:rPr lang="en-US" smtClean="0"/>
-              <a:t>6/6/21</a:t>
+              <a:t>6/9/21</a:t>
             </a:fld>
             <a:endParaRPr lang="en-US"/>
           </a:p>
@@ -1186,7 +1186,7 @@
           <a:p>
             <a:fld id="{2942B52E-AAA8-43C8-B328-AD22BB1092E1}" type="datetimeFigureOut">
               <a:rPr lang="en-US" smtClean="0"/>
-              <a:t>6/6/21</a:t>
+              <a:t>6/9/21</a:t>
             </a:fld>
             <a:endParaRPr lang="en-US"/>
           </a:p>
@@ -1454,7 +1454,7 @@
           <a:p>
             <a:fld id="{2942B52E-AAA8-43C8-B328-AD22BB1092E1}" type="datetimeFigureOut">
               <a:rPr lang="en-US" smtClean="0"/>
-              <a:t>6/6/21</a:t>
+              <a:t>6/9/21</a:t>
             </a:fld>
             <a:endParaRPr lang="en-US"/>
           </a:p>
@@ -1869,7 +1869,7 @@
           <a:p>
             <a:fld id="{2942B52E-AAA8-43C8-B328-AD22BB1092E1}" type="datetimeFigureOut">
               <a:rPr lang="en-US" smtClean="0"/>
-              <a:t>6/6/21</a:t>
+              <a:t>6/9/21</a:t>
             </a:fld>
             <a:endParaRPr lang="en-US"/>
           </a:p>
@@ -2011,7 +2011,7 @@
           <a:p>
             <a:fld id="{2942B52E-AAA8-43C8-B328-AD22BB1092E1}" type="datetimeFigureOut">
               <a:rPr lang="en-US" smtClean="0"/>
-              <a:t>6/6/21</a:t>
+              <a:t>6/9/21</a:t>
             </a:fld>
             <a:endParaRPr lang="en-US"/>
           </a:p>
@@ -2124,7 +2124,7 @@
           <a:p>
             <a:fld id="{2942B52E-AAA8-43C8-B328-AD22BB1092E1}" type="datetimeFigureOut">
               <a:rPr lang="en-US" smtClean="0"/>
-              <a:t>6/6/21</a:t>
+              <a:t>6/9/21</a:t>
             </a:fld>
             <a:endParaRPr lang="en-US"/>
           </a:p>
@@ -2437,7 +2437,7 @@
           <a:p>
             <a:fld id="{2942B52E-AAA8-43C8-B328-AD22BB1092E1}" type="datetimeFigureOut">
               <a:rPr lang="en-US" smtClean="0"/>
-              <a:t>6/6/21</a:t>
+              <a:t>6/9/21</a:t>
             </a:fld>
             <a:endParaRPr lang="en-US"/>
           </a:p>
@@ -2726,7 +2726,7 @@
           <a:p>
             <a:fld id="{2942B52E-AAA8-43C8-B328-AD22BB1092E1}" type="datetimeFigureOut">
               <a:rPr lang="en-US" smtClean="0"/>
-              <a:t>6/6/21</a:t>
+              <a:t>6/9/21</a:t>
             </a:fld>
             <a:endParaRPr lang="en-US"/>
           </a:p>
@@ -2969,7 +2969,7 @@
           <a:p>
             <a:fld id="{2942B52E-AAA8-43C8-B328-AD22BB1092E1}" type="datetimeFigureOut">
               <a:rPr lang="en-US" smtClean="0"/>
-              <a:t>6/6/21</a:t>
+              <a:t>6/9/21</a:t>
             </a:fld>
             <a:endParaRPr lang="en-US"/>
           </a:p>
@@ -3518,8 +3518,8 @@
           </a:p>
         </p:txBody>
       </p:sp>
-      <mc:AlternateContent xmlns:mc="http://schemas.openxmlformats.org/markup-compatibility/2006">
-        <mc:Choice xmlns:a14="http://schemas.microsoft.com/office/drawing/2010/main" Requires="a14">
+      <mc:AlternateContent xmlns:mc="http://schemas.openxmlformats.org/markup-compatibility/2006" xmlns:a14="http://schemas.microsoft.com/office/drawing/2010/main">
+        <mc:Choice Requires="a14">
           <p:sp>
             <p:nvSpPr>
               <p:cNvPr id="3" name="Content Placeholder 2">
@@ -4086,14 +4086,7 @@
                             <a:latin typeface="Cambria Math" panose="02040503050406030204" pitchFamily="18" charset="0"/>
                             <a:ea typeface="Cambria Math" panose="02040503050406030204" pitchFamily="18" charset="0"/>
                           </a:rPr>
-                          <m:t>,</m:t>
-                        </m:r>
-                        <m:r>
-                          <a:rPr lang="en-US" i="1">
-                            <a:latin typeface="Cambria Math" panose="02040503050406030204" pitchFamily="18" charset="0"/>
-                            <a:ea typeface="Cambria Math" panose="02040503050406030204" pitchFamily="18" charset="0"/>
-                          </a:rPr>
-                          <m:t>ℓ</m:t>
+                          <m:t>,ℓ</m:t>
                         </m:r>
                         <m:d>
                           <m:dPr>
@@ -4253,7 +4246,7 @@
             </p:txBody>
           </p:sp>
         </mc:Choice>
-        <mc:Fallback>
+        <mc:Fallback xmlns="">
           <p:sp>
             <p:nvSpPr>
               <p:cNvPr id="3" name="Content Placeholder 2">
@@ -4384,17 +4377,25 @@
             </a:pPr>
             <a:r>
               <a:rPr lang="en-IL" dirty="0"/>
-              <a:t>Results averaged over 20 seeds.</a:t>
+              <a:t>Results averaged </a:t>
+            </a:r>
+            <a:r>
+              <a:rPr lang="en-IL"/>
+              <a:t>over 15 </a:t>
+            </a:r>
+            <a:r>
+              <a:rPr lang="en-IL" dirty="0"/>
+              <a:t>seeds.</a:t>
             </a:r>
           </a:p>
         </p:txBody>
       </p:sp>
       <p:pic>
         <p:nvPicPr>
-          <p:cNvPr id="5" name="Picture 4" descr="Table&#10;&#10;Description automatically generated">
+          <p:cNvPr id="11" name="Picture 10" descr="Table&#10;&#10;Description automatically generated">
             <a:extLst>
               <a:ext uri="{FF2B5EF4-FFF2-40B4-BE49-F238E27FC236}">
-                <a16:creationId xmlns:a16="http://schemas.microsoft.com/office/drawing/2014/main" id="{1EE33A5A-1F1E-6C42-8A1E-DE206C435DD9}"/>
+                <a16:creationId xmlns:a16="http://schemas.microsoft.com/office/drawing/2014/main" id="{1E342383-CCBE-9545-A135-0BA73B982E01}"/>
               </a:ext>
             </a:extLst>
           </p:cNvPr>
@@ -4403,7 +4404,7 @@
           </p:cNvPicPr>
           <p:nvPr/>
         </p:nvPicPr>
-        <p:blipFill>
+        <p:blipFill rotWithShape="1">
           <a:blip r:embed="rId2">
             <a:extLst>
               <a:ext uri="{28A0092B-C50C-407E-A947-70E740481C1C}">
@@ -4411,14 +4412,13 @@
               </a:ext>
             </a:extLst>
           </a:blip>
-          <a:stretch>
-            <a:fillRect/>
-          </a:stretch>
+          <a:srcRect t="3522"/>
+          <a:stretch/>
         </p:blipFill>
         <p:spPr>
           <a:xfrm>
-            <a:off x="1498600" y="4683860"/>
-            <a:ext cx="9194800" cy="1739900"/>
+            <a:off x="1651000" y="4682728"/>
+            <a:ext cx="9093200" cy="1568344"/>
           </a:xfrm>
           <a:prstGeom prst="rect">
             <a:avLst/>
@@ -4427,10 +4427,10 @@
       </p:pic>
       <p:pic>
         <p:nvPicPr>
-          <p:cNvPr id="7" name="Picture 6" descr="Table&#10;&#10;Description automatically generated">
+          <p:cNvPr id="13" name="Picture 12" descr="Table&#10;&#10;Description automatically generated">
             <a:extLst>
               <a:ext uri="{FF2B5EF4-FFF2-40B4-BE49-F238E27FC236}">
-                <a16:creationId xmlns:a16="http://schemas.microsoft.com/office/drawing/2014/main" id="{9E4131E5-D635-114C-9C82-2F0D315A6D6E}"/>
+                <a16:creationId xmlns:a16="http://schemas.microsoft.com/office/drawing/2014/main" id="{16A3967D-5493-8141-B0B4-F5DD6426B057}"/>
               </a:ext>
             </a:extLst>
           </p:cNvPr>
@@ -4453,8 +4453,8 @@
         </p:blipFill>
         <p:spPr>
           <a:xfrm>
-            <a:off x="1644650" y="2508191"/>
-            <a:ext cx="8902700" cy="1752600"/>
+            <a:off x="1651000" y="2622550"/>
+            <a:ext cx="8890000" cy="1612900"/>
           </a:xfrm>
           <a:prstGeom prst="rect">
             <a:avLst/>
@@ -4520,8 +4520,8 @@
           </a:p>
         </p:txBody>
       </p:sp>
-      <mc:AlternateContent xmlns:mc="http://schemas.openxmlformats.org/markup-compatibility/2006">
-        <mc:Choice xmlns:a14="http://schemas.microsoft.com/office/drawing/2010/main" Requires="a14">
+      <mc:AlternateContent xmlns:mc="http://schemas.openxmlformats.org/markup-compatibility/2006" xmlns:a14="http://schemas.microsoft.com/office/drawing/2010/main">
+        <mc:Choice Requires="a14">
           <p:sp>
             <p:nvSpPr>
               <p:cNvPr id="3" name="Content Placeholder 2">
@@ -5098,7 +5098,7 @@
             </p:txBody>
           </p:sp>
         </mc:Choice>
-        <mc:Fallback>
+        <mc:Fallback xmlns="">
           <p:sp>
             <p:nvSpPr>
               <p:cNvPr id="3" name="Content Placeholder 2">
@@ -5202,8 +5202,8 @@
           </a:p>
         </p:txBody>
       </p:sp>
-      <mc:AlternateContent xmlns:mc="http://schemas.openxmlformats.org/markup-compatibility/2006">
-        <mc:Choice xmlns:a14="http://schemas.microsoft.com/office/drawing/2010/main" Requires="a14">
+      <mc:AlternateContent xmlns:mc="http://schemas.openxmlformats.org/markup-compatibility/2006" xmlns:a14="http://schemas.microsoft.com/office/drawing/2010/main">
+        <mc:Choice Requires="a14">
           <p:sp>
             <p:nvSpPr>
               <p:cNvPr id="3" name="Content Placeholder 2">
@@ -5885,7 +5885,7 @@
             </p:txBody>
           </p:sp>
         </mc:Choice>
-        <mc:Fallback>
+        <mc:Fallback xmlns="">
           <p:sp>
             <p:nvSpPr>
               <p:cNvPr id="3" name="Content Placeholder 2">
@@ -6824,8 +6824,8 @@
           </a:p>
         </p:txBody>
       </p:sp>
-      <mc:AlternateContent xmlns:mc="http://schemas.openxmlformats.org/markup-compatibility/2006">
-        <mc:Choice xmlns:a14="http://schemas.microsoft.com/office/drawing/2010/main" Requires="a14">
+      <mc:AlternateContent xmlns:mc="http://schemas.openxmlformats.org/markup-compatibility/2006" xmlns:a14="http://schemas.microsoft.com/office/drawing/2010/main">
+        <mc:Choice Requires="a14">
           <p:sp>
             <p:nvSpPr>
               <p:cNvPr id="3" name="Content Placeholder 2">
@@ -7031,7 +7031,7 @@
             </p:txBody>
           </p:sp>
         </mc:Choice>
-        <mc:Fallback>
+        <mc:Fallback xmlns="">
           <p:sp>
             <p:nvSpPr>
               <p:cNvPr id="3" name="Content Placeholder 2">
@@ -7184,8 +7184,8 @@
           </a:p>
         </p:txBody>
       </p:sp>
-      <mc:AlternateContent xmlns:mc="http://schemas.openxmlformats.org/markup-compatibility/2006">
-        <mc:Choice xmlns:a14="http://schemas.microsoft.com/office/drawing/2010/main" Requires="a14">
+      <mc:AlternateContent xmlns:mc="http://schemas.openxmlformats.org/markup-compatibility/2006" xmlns:a14="http://schemas.microsoft.com/office/drawing/2010/main">
+        <mc:Choice Requires="a14">
           <p:sp>
             <p:nvSpPr>
               <p:cNvPr id="3" name="Content Placeholder 2">
@@ -7466,7 +7466,7 @@
             </p:txBody>
           </p:sp>
         </mc:Choice>
-        <mc:Fallback>
+        <mc:Fallback xmlns="">
           <p:sp>
             <p:nvSpPr>
               <p:cNvPr id="3" name="Content Placeholder 2">
@@ -7566,8 +7566,8 @@
           </a:p>
         </p:txBody>
       </p:sp>
-      <mc:AlternateContent xmlns:mc="http://schemas.openxmlformats.org/markup-compatibility/2006">
-        <mc:Choice xmlns:a14="http://schemas.microsoft.com/office/drawing/2010/main" Requires="a14">
+      <mc:AlternateContent xmlns:mc="http://schemas.openxmlformats.org/markup-compatibility/2006" xmlns:a14="http://schemas.microsoft.com/office/drawing/2010/main">
+        <mc:Choice Requires="a14">
           <p:sp>
             <p:nvSpPr>
               <p:cNvPr id="3" name="Content Placeholder 2">
@@ -7872,14 +7872,7 @@
                                   <a:latin typeface="Cambria Math" panose="02040503050406030204" pitchFamily="18" charset="0"/>
                                   <a:ea typeface="Cambria Math" panose="02040503050406030204" pitchFamily="18" charset="0"/>
                                 </a:rPr>
-                                <m:t>,</m:t>
-                              </m:r>
-                              <m:r>
-                                <a:rPr lang="en-US" i="1">
-                                  <a:latin typeface="Cambria Math" panose="02040503050406030204" pitchFamily="18" charset="0"/>
-                                  <a:ea typeface="Cambria Math" panose="02040503050406030204" pitchFamily="18" charset="0"/>
-                                </a:rPr>
-                                <m:t>ℓ</m:t>
+                                <m:t>,ℓ</m:t>
                               </m:r>
                               <m:d>
                                 <m:dPr>
@@ -8191,7 +8184,7 @@
             </p:txBody>
           </p:sp>
         </mc:Choice>
-        <mc:Fallback>
+        <mc:Fallback xmlns="">
           <p:sp>
             <p:nvSpPr>
               <p:cNvPr id="3" name="Content Placeholder 2">

</xml_diff>

<commit_message>
minor change in the slide
</commit_message>
<xml_diff>
--- a/236802/ARL presentation.pptx
+++ b/236802/ARL presentation.pptx
@@ -8604,8 +8604,8 @@
           </a:p>
         </p:txBody>
       </p:sp>
-      <mc:AlternateContent xmlns:mc="http://schemas.openxmlformats.org/markup-compatibility/2006" xmlns:a14="http://schemas.microsoft.com/office/drawing/2010/main">
-        <mc:Choice Requires="a14">
+      <mc:AlternateContent xmlns:mc="http://schemas.openxmlformats.org/markup-compatibility/2006">
+        <mc:Choice xmlns:a14="http://schemas.microsoft.com/office/drawing/2010/main" Requires="a14">
           <p:sp>
             <p:nvSpPr>
               <p:cNvPr id="3" name="Content Placeholder 2">
@@ -8676,7 +8676,7 @@
                 </a:pPr>
                 <a:r>
                   <a:rPr lang="en-US" dirty="0"/>
-                  <a:t>Instead, we can demand  that the loss will be independent of the feature vector:</a:t>
+                  <a:t>Instead, we can demand that the loss will be independent of the feature vector:</a:t>
                 </a:r>
               </a:p>
               <a:p>
@@ -8886,7 +8886,7 @@
             </p:txBody>
           </p:sp>
         </mc:Choice>
-        <mc:Fallback xmlns="">
+        <mc:Fallback>
           <p:sp>
             <p:nvSpPr>
               <p:cNvPr id="3" name="Content Placeholder 2">

</xml_diff>